<commit_message>
revise instructions and demo
</commit_message>
<xml_diff>
--- a/utils/figures.pptx
+++ b/utils/figures.pptx
@@ -257,7 +257,7 @@
           <a:p>
             <a:fld id="{EDFA6495-1F92-459E-8922-78823434FBD8}" type="datetimeFigureOut">
               <a:rPr lang="en-GB" smtClean="0"/>
-              <a:t>28/02/2021</a:t>
+              <a:t>10/03/2021</a:t>
             </a:fld>
             <a:endParaRPr lang="en-GB"/>
           </a:p>
@@ -427,7 +427,7 @@
           <a:p>
             <a:fld id="{EDFA6495-1F92-459E-8922-78823434FBD8}" type="datetimeFigureOut">
               <a:rPr lang="en-GB" smtClean="0"/>
-              <a:t>28/02/2021</a:t>
+              <a:t>10/03/2021</a:t>
             </a:fld>
             <a:endParaRPr lang="en-GB"/>
           </a:p>
@@ -607,7 +607,7 @@
           <a:p>
             <a:fld id="{EDFA6495-1F92-459E-8922-78823434FBD8}" type="datetimeFigureOut">
               <a:rPr lang="en-GB" smtClean="0"/>
-              <a:t>28/02/2021</a:t>
+              <a:t>10/03/2021</a:t>
             </a:fld>
             <a:endParaRPr lang="en-GB"/>
           </a:p>
@@ -777,7 +777,7 @@
           <a:p>
             <a:fld id="{EDFA6495-1F92-459E-8922-78823434FBD8}" type="datetimeFigureOut">
               <a:rPr lang="en-GB" smtClean="0"/>
-              <a:t>28/02/2021</a:t>
+              <a:t>10/03/2021</a:t>
             </a:fld>
             <a:endParaRPr lang="en-GB"/>
           </a:p>
@@ -1021,7 +1021,7 @@
           <a:p>
             <a:fld id="{EDFA6495-1F92-459E-8922-78823434FBD8}" type="datetimeFigureOut">
               <a:rPr lang="en-GB" smtClean="0"/>
-              <a:t>28/02/2021</a:t>
+              <a:t>10/03/2021</a:t>
             </a:fld>
             <a:endParaRPr lang="en-GB"/>
           </a:p>
@@ -1253,7 +1253,7 @@
           <a:p>
             <a:fld id="{EDFA6495-1F92-459E-8922-78823434FBD8}" type="datetimeFigureOut">
               <a:rPr lang="en-GB" smtClean="0"/>
-              <a:t>28/02/2021</a:t>
+              <a:t>10/03/2021</a:t>
             </a:fld>
             <a:endParaRPr lang="en-GB"/>
           </a:p>
@@ -1620,7 +1620,7 @@
           <a:p>
             <a:fld id="{EDFA6495-1F92-459E-8922-78823434FBD8}" type="datetimeFigureOut">
               <a:rPr lang="en-GB" smtClean="0"/>
-              <a:t>28/02/2021</a:t>
+              <a:t>10/03/2021</a:t>
             </a:fld>
             <a:endParaRPr lang="en-GB"/>
           </a:p>
@@ -1738,7 +1738,7 @@
           <a:p>
             <a:fld id="{EDFA6495-1F92-459E-8922-78823434FBD8}" type="datetimeFigureOut">
               <a:rPr lang="en-GB" smtClean="0"/>
-              <a:t>28/02/2021</a:t>
+              <a:t>10/03/2021</a:t>
             </a:fld>
             <a:endParaRPr lang="en-GB"/>
           </a:p>
@@ -1833,7 +1833,7 @@
           <a:p>
             <a:fld id="{EDFA6495-1F92-459E-8922-78823434FBD8}" type="datetimeFigureOut">
               <a:rPr lang="en-GB" smtClean="0"/>
-              <a:t>28/02/2021</a:t>
+              <a:t>10/03/2021</a:t>
             </a:fld>
             <a:endParaRPr lang="en-GB"/>
           </a:p>
@@ -2110,7 +2110,7 @@
           <a:p>
             <a:fld id="{EDFA6495-1F92-459E-8922-78823434FBD8}" type="datetimeFigureOut">
               <a:rPr lang="en-GB" smtClean="0"/>
-              <a:t>28/02/2021</a:t>
+              <a:t>10/03/2021</a:t>
             </a:fld>
             <a:endParaRPr lang="en-GB"/>
           </a:p>
@@ -2367,7 +2367,7 @@
           <a:p>
             <a:fld id="{EDFA6495-1F92-459E-8922-78823434FBD8}" type="datetimeFigureOut">
               <a:rPr lang="en-GB" smtClean="0"/>
-              <a:t>28/02/2021</a:t>
+              <a:t>10/03/2021</a:t>
             </a:fld>
             <a:endParaRPr lang="en-GB"/>
           </a:p>
@@ -2580,7 +2580,7 @@
           <a:p>
             <a:fld id="{EDFA6495-1F92-459E-8922-78823434FBD8}" type="datetimeFigureOut">
               <a:rPr lang="en-GB" smtClean="0"/>
-              <a:t>28/02/2021</a:t>
+              <a:t>10/03/2021</a:t>
             </a:fld>
             <a:endParaRPr lang="en-GB"/>
           </a:p>
@@ -3024,6 +3024,58 @@
           </a:prstGeom>
         </p:spPr>
       </p:pic>
+      <p:sp>
+        <p:nvSpPr>
+          <p:cNvPr id="2" name="Rectangle 1">
+            <a:extLst>
+              <a:ext uri="{FF2B5EF4-FFF2-40B4-BE49-F238E27FC236}">
+                <a16:creationId xmlns:a16="http://schemas.microsoft.com/office/drawing/2014/main" id="{EFB43264-18E2-4235-8C4C-556D71F22E5B}"/>
+              </a:ext>
+            </a:extLst>
+          </p:cNvPr>
+          <p:cNvSpPr/>
+          <p:nvPr/>
+        </p:nvSpPr>
+        <p:spPr>
+          <a:xfrm>
+            <a:off x="1058988" y="2594112"/>
+            <a:ext cx="1540565" cy="1302026"/>
+          </a:xfrm>
+          <a:prstGeom prst="rect">
+            <a:avLst/>
+          </a:prstGeom>
+          <a:solidFill>
+            <a:srgbClr val="4CAF50"/>
+          </a:solidFill>
+          <a:ln>
+            <a:noFill/>
+          </a:ln>
+        </p:spPr>
+        <p:style>
+          <a:lnRef idx="2">
+            <a:schemeClr val="accent1">
+              <a:shade val="50000"/>
+            </a:schemeClr>
+          </a:lnRef>
+          <a:fillRef idx="1">
+            <a:schemeClr val="accent1"/>
+          </a:fillRef>
+          <a:effectRef idx="0">
+            <a:schemeClr val="accent1"/>
+          </a:effectRef>
+          <a:fontRef idx="minor">
+            <a:schemeClr val="lt1"/>
+          </a:fontRef>
+        </p:style>
+        <p:txBody>
+          <a:bodyPr rtlCol="0" anchor="ctr"/>
+          <a:lstStyle/>
+          <a:p>
+            <a:pPr algn="ctr"/>
+            <a:endParaRPr lang="en-SG"/>
+          </a:p>
+        </p:txBody>
+      </p:sp>
       <p:pic>
         <p:nvPicPr>
           <p:cNvPr id="8" name="Graphic 7">
@@ -3093,6 +3145,58 @@
           <a:chExt cx="0" cy="0"/>
         </a:xfrm>
       </p:grpSpPr>
+      <p:sp>
+        <p:nvSpPr>
+          <p:cNvPr id="5" name="Rectangle 4">
+            <a:extLst>
+              <a:ext uri="{FF2B5EF4-FFF2-40B4-BE49-F238E27FC236}">
+                <a16:creationId xmlns:a16="http://schemas.microsoft.com/office/drawing/2014/main" id="{01D22296-740A-4B3C-991F-E023951B7649}"/>
+              </a:ext>
+            </a:extLst>
+          </p:cNvPr>
+          <p:cNvSpPr/>
+          <p:nvPr/>
+        </p:nvSpPr>
+        <p:spPr>
+          <a:xfrm>
+            <a:off x="2529979" y="1083364"/>
+            <a:ext cx="1540565" cy="1590261"/>
+          </a:xfrm>
+          <a:prstGeom prst="rect">
+            <a:avLst/>
+          </a:prstGeom>
+          <a:solidFill>
+            <a:srgbClr val="4CAF50"/>
+          </a:solidFill>
+          <a:ln>
+            <a:noFill/>
+          </a:ln>
+        </p:spPr>
+        <p:style>
+          <a:lnRef idx="2">
+            <a:schemeClr val="accent1">
+              <a:shade val="50000"/>
+            </a:schemeClr>
+          </a:lnRef>
+          <a:fillRef idx="1">
+            <a:schemeClr val="accent1"/>
+          </a:fillRef>
+          <a:effectRef idx="0">
+            <a:schemeClr val="accent1"/>
+          </a:effectRef>
+          <a:fontRef idx="minor">
+            <a:schemeClr val="lt1"/>
+          </a:fontRef>
+        </p:style>
+        <p:txBody>
+          <a:bodyPr rtlCol="0" anchor="ctr"/>
+          <a:lstStyle/>
+          <a:p>
+            <a:pPr algn="ctr"/>
+            <a:endParaRPr lang="en-SG"/>
+          </a:p>
+        </p:txBody>
+      </p:sp>
       <p:pic>
         <p:nvPicPr>
           <p:cNvPr id="6" name="Graphic 5">
@@ -3124,7 +3228,7 @@
         </p:blipFill>
         <p:spPr>
           <a:xfrm rot="16200000">
-            <a:off x="1985010" y="0"/>
+            <a:off x="1984216" y="0"/>
             <a:ext cx="3230880" cy="3230880"/>
           </a:xfrm>
           <a:prstGeom prst="rect">
@@ -3413,13 +3517,13 @@
           <p:nvPr/>
         </p:nvPicPr>
         <p:blipFill>
-          <a:blip r:embed="rId2">
+          <a:blip r:embed="rId4">
             <a:extLst>
               <a:ext uri="{28A0092B-C50C-407E-A947-70E740481C1C}">
                 <a14:useLocalDpi xmlns:a14="http://schemas.microsoft.com/office/drawing/2010/main" val="0"/>
               </a:ext>
               <a:ext uri="{96DAC541-7B7A-43D3-8B79-37D633B846F1}">
-                <asvg:svgBlip xmlns:asvg="http://schemas.microsoft.com/office/drawing/2016/SVG/main" r:embed="rId3"/>
+                <asvg:svgBlip xmlns:asvg="http://schemas.microsoft.com/office/drawing/2016/SVG/main" r:embed="rId5"/>
               </a:ext>
             </a:extLst>
           </a:blip>
@@ -3679,13 +3783,13 @@
           <p:nvPr/>
         </p:nvPicPr>
         <p:blipFill>
-          <a:blip r:embed="rId2">
+          <a:blip r:embed="rId4">
             <a:extLst>
               <a:ext uri="{28A0092B-C50C-407E-A947-70E740481C1C}">
                 <a14:useLocalDpi xmlns:a14="http://schemas.microsoft.com/office/drawing/2010/main" val="0"/>
               </a:ext>
               <a:ext uri="{96DAC541-7B7A-43D3-8B79-37D633B846F1}">
-                <asvg:svgBlip xmlns:asvg="http://schemas.microsoft.com/office/drawing/2016/SVG/main" r:embed="rId3"/>
+                <asvg:svgBlip xmlns:asvg="http://schemas.microsoft.com/office/drawing/2016/SVG/main" r:embed="rId5"/>
               </a:ext>
             </a:extLst>
           </a:blip>

</xml_diff>